<commit_message>
preparing to push to Heroku
</commit_message>
<xml_diff>
--- a/misc/push_notification_overview.pptx
+++ b/misc/push_notification_overview.pptx
@@ -104,6 +104,11 @@
       </a:defRPr>
     </a:lvl9pPr>
   </p:defaultTextStyle>
+  <p:extLst>
+    <p:ext uri="{EFAFB233-063F-42B5-8137-9DF3F51BA10A}">
+      <p15:sldGuideLst xmlns:p15="http://schemas.microsoft.com/office/powerpoint/2012/main"/>
+    </p:ext>
+  </p:extLst>
 </p:presentation>
 </file>
 
@@ -4947,8 +4952,8 @@
         </p:nvSpPr>
         <p:spPr>
           <a:xfrm rot="21166376">
-            <a:off x="6685173" y="587858"/>
-            <a:ext cx="1199911" cy="738664"/>
+            <a:off x="6603656" y="593005"/>
+            <a:ext cx="1281753" cy="738664"/>
           </a:xfrm>
           <a:prstGeom prst="rect">
             <a:avLst/>
@@ -4963,7 +4968,11 @@
           <a:p>
             <a:r>
               <a:rPr lang="en-US" sz="1400" dirty="0" smtClean="0"/>
-              <a:t>(9) Send push notification to Firebase</a:t>
+              <a:t>(10) </a:t>
+            </a:r>
+            <a:r>
+              <a:rPr lang="en-US" sz="1400" dirty="0" smtClean="0"/>
+              <a:t>Send push notification to Firebase</a:t>
             </a:r>
             <a:endParaRPr lang="en-US" sz="1400" dirty="0"/>
           </a:p>
@@ -4994,7 +5003,15 @@
             <a:pPr algn="ctr"/>
             <a:r>
               <a:rPr lang="en-US" sz="1400" dirty="0" smtClean="0"/>
-              <a:t>(10) Send </a:t>
+              <a:t>(</a:t>
+            </a:r>
+            <a:r>
+              <a:rPr lang="en-US" sz="1400" dirty="0" smtClean="0"/>
+              <a:t>11) </a:t>
+            </a:r>
+            <a:r>
+              <a:rPr lang="en-US" sz="1400" dirty="0" smtClean="0"/>
+              <a:t>Send </a:t>
             </a:r>
           </a:p>
           <a:p>
@@ -5050,7 +5067,15 @@
                   <a:schemeClr val="tx1"/>
                 </a:solidFill>
               </a:rPr>
-              <a:t>(9) Collect FCM token from database</a:t>
+              <a:t>(9) </a:t>
+            </a:r>
+            <a:r>
+              <a:rPr lang="en-US" sz="1400" dirty="0" smtClean="0">
+                <a:solidFill>
+                  <a:schemeClr val="tx1"/>
+                </a:solidFill>
+              </a:rPr>
+              <a:t>Collect FCM token from database</a:t>
             </a:r>
             <a:endParaRPr lang="en-US" sz="1400" dirty="0">
               <a:solidFill>

</xml_diff>